<commit_message>
bergupdate: worked on rCGH script
</commit_message>
<xml_diff>
--- a/docs/docs_I_made/slides/rCGH.pptx
+++ b/docs/docs_I_made/slides/rCGH.pptx
@@ -11,6 +11,7 @@
     <p:sldId id="260" r:id="rId5"/>
     <p:sldId id="267" r:id="rId6"/>
     <p:sldId id="269" r:id="rId7"/>
+    <p:sldId id="270" r:id="rId8"/>
   </p:sldIdLst>
   <p:sldSz cx="12192000" cy="6858000"/>
   <p:notesSz cx="6858000" cy="9144000"/>
@@ -844,7 +845,7 @@
             <a:fld id="{B61BEF0D-F0BB-DE4B-95CE-6DB70DBA9567}" type="datetimeFigureOut">
               <a:rPr lang="en-US" smtClean="0"/>
               <a:pPr/>
-              <a:t>4/20/2022</a:t>
+              <a:t>4/21/2022</a:t>
             </a:fld>
             <a:endParaRPr lang="en-US" dirty="0"/>
           </a:p>
@@ -1097,7 +1098,7 @@
             <a:fld id="{B61BEF0D-F0BB-DE4B-95CE-6DB70DBA9567}" type="datetimeFigureOut">
               <a:rPr lang="en-US" smtClean="0"/>
               <a:pPr/>
-              <a:t>4/20/2022</a:t>
+              <a:t>4/21/2022</a:t>
             </a:fld>
             <a:endParaRPr lang="en-US" dirty="0"/>
           </a:p>
@@ -1413,7 +1414,7 @@
             <a:fld id="{B61BEF0D-F0BB-DE4B-95CE-6DB70DBA9567}" type="datetimeFigureOut">
               <a:rPr lang="en-US" smtClean="0"/>
               <a:pPr/>
-              <a:t>4/20/2022</a:t>
+              <a:t>4/21/2022</a:t>
             </a:fld>
             <a:endParaRPr lang="en-US" dirty="0"/>
           </a:p>
@@ -1742,7 +1743,7 @@
             <a:fld id="{B61BEF0D-F0BB-DE4B-95CE-6DB70DBA9567}" type="datetimeFigureOut">
               <a:rPr lang="en-US" smtClean="0"/>
               <a:pPr/>
-              <a:t>4/20/2022</a:t>
+              <a:t>4/21/2022</a:t>
             </a:fld>
             <a:endParaRPr lang="en-US" dirty="0"/>
           </a:p>
@@ -2058,7 +2059,7 @@
             <a:fld id="{B61BEF0D-F0BB-DE4B-95CE-6DB70DBA9567}" type="datetimeFigureOut">
               <a:rPr lang="en-US" smtClean="0"/>
               <a:pPr/>
-              <a:t>4/20/2022</a:t>
+              <a:t>4/21/2022</a:t>
             </a:fld>
             <a:endParaRPr lang="en-US" dirty="0"/>
           </a:p>
@@ -2447,7 +2448,7 @@
             <a:fld id="{B61BEF0D-F0BB-DE4B-95CE-6DB70DBA9567}" type="datetimeFigureOut">
               <a:rPr lang="en-US" smtClean="0"/>
               <a:pPr/>
-              <a:t>4/20/2022</a:t>
+              <a:t>4/21/2022</a:t>
             </a:fld>
             <a:endParaRPr lang="en-US" dirty="0"/>
           </a:p>
@@ -2618,7 +2619,7 @@
           <a:p>
             <a:fld id="{55C6B4A9-1611-4792-9094-5F34BCA07E0B}" type="datetimeFigureOut">
               <a:rPr lang="en-US" smtClean="0"/>
-              <a:t>4/20/2022</a:t>
+              <a:t>4/21/2022</a:t>
             </a:fld>
             <a:endParaRPr lang="en-US" dirty="0"/>
           </a:p>
@@ -2799,7 +2800,7 @@
             <a:fld id="{B61BEF0D-F0BB-DE4B-95CE-6DB70DBA9567}" type="datetimeFigureOut">
               <a:rPr lang="en-US" smtClean="0"/>
               <a:pPr/>
-              <a:t>4/20/2022</a:t>
+              <a:t>4/21/2022</a:t>
             </a:fld>
             <a:endParaRPr lang="en-US" dirty="0"/>
           </a:p>
@@ -2971,7 +2972,7 @@
             <a:fld id="{B61BEF0D-F0BB-DE4B-95CE-6DB70DBA9567}" type="datetimeFigureOut">
               <a:rPr lang="en-US" smtClean="0"/>
               <a:pPr/>
-              <a:t>4/20/2022</a:t>
+              <a:t>4/21/2022</a:t>
             </a:fld>
             <a:endParaRPr lang="en-US" dirty="0"/>
           </a:p>
@@ -3220,7 +3221,7 @@
             <a:fld id="{B61BEF0D-F0BB-DE4B-95CE-6DB70DBA9567}" type="datetimeFigureOut">
               <a:rPr lang="en-US" smtClean="0"/>
               <a:pPr/>
-              <a:t>4/20/2022</a:t>
+              <a:t>4/21/2022</a:t>
             </a:fld>
             <a:endParaRPr lang="en-US" dirty="0"/>
           </a:p>
@@ -3453,7 +3454,7 @@
           <a:p>
             <a:fld id="{EB712588-04B1-427B-82EE-E8DB90309F08}" type="datetimeFigureOut">
               <a:rPr lang="en-US" smtClean="0"/>
-              <a:t>4/20/2022</a:t>
+              <a:t>4/21/2022</a:t>
             </a:fld>
             <a:endParaRPr lang="en-US" dirty="0"/>
           </a:p>
@@ -3828,7 +3829,7 @@
             <a:fld id="{B61BEF0D-F0BB-DE4B-95CE-6DB70DBA9567}" type="datetimeFigureOut">
               <a:rPr lang="en-US" smtClean="0"/>
               <a:pPr/>
-              <a:t>4/20/2022</a:t>
+              <a:t>4/21/2022</a:t>
             </a:fld>
             <a:endParaRPr lang="en-US" dirty="0"/>
           </a:p>
@@ -3953,7 +3954,7 @@
             <a:fld id="{B61BEF0D-F0BB-DE4B-95CE-6DB70DBA9567}" type="datetimeFigureOut">
               <a:rPr lang="en-US" smtClean="0"/>
               <a:pPr/>
-              <a:t>4/20/2022</a:t>
+              <a:t>4/21/2022</a:t>
             </a:fld>
             <a:endParaRPr lang="en-US" dirty="0"/>
           </a:p>
@@ -4050,7 +4051,7 @@
             <a:fld id="{B61BEF0D-F0BB-DE4B-95CE-6DB70DBA9567}" type="datetimeFigureOut">
               <a:rPr lang="en-US" smtClean="0"/>
               <a:pPr/>
-              <a:t>4/20/2022</a:t>
+              <a:t>4/21/2022</a:t>
             </a:fld>
             <a:endParaRPr lang="en-US" dirty="0"/>
           </a:p>
@@ -4306,7 +4307,7 @@
           <a:p>
             <a:fld id="{42A54C80-263E-416B-A8E0-580EDEADCBDC}" type="datetimeFigureOut">
               <a:rPr lang="en-US" smtClean="0"/>
-              <a:t>4/20/2022</a:t>
+              <a:t>4/21/2022</a:t>
             </a:fld>
             <a:endParaRPr lang="en-US" dirty="0"/>
           </a:p>
@@ -4570,7 +4571,7 @@
             <a:fld id="{B61BEF0D-F0BB-DE4B-95CE-6DB70DBA9567}" type="datetimeFigureOut">
               <a:rPr lang="en-US" smtClean="0"/>
               <a:pPr/>
-              <a:t>4/20/2022</a:t>
+              <a:t>4/21/2022</a:t>
             </a:fld>
             <a:endParaRPr lang="en-US" dirty="0"/>
           </a:p>
@@ -5317,7 +5318,7 @@
             <a:fld id="{B61BEF0D-F0BB-DE4B-95CE-6DB70DBA9567}" type="datetimeFigureOut">
               <a:rPr lang="en-US" smtClean="0"/>
               <a:pPr/>
-              <a:t>4/20/2022</a:t>
+              <a:t>4/21/2022</a:t>
             </a:fld>
             <a:endParaRPr lang="en-US" dirty="0"/>
           </a:p>
@@ -6669,25 +6670,35 @@
           </a:p>
         </p:txBody>
       </p:sp>
-      <p:sp>
-        <p:nvSpPr>
-          <p:cNvPr id="4" name="Espace réservé du contenu 3"/>
-          <p:cNvSpPr>
-            <a:spLocks noGrp="1"/>
-          </p:cNvSpPr>
+      <p:pic>
+        <p:nvPicPr>
+          <p:cNvPr id="5" name="Espace réservé du contenu 4"/>
+          <p:cNvPicPr>
+            <a:picLocks noGrp="1" noChangeAspect="1"/>
+          </p:cNvPicPr>
           <p:nvPr>
             <p:ph idx="1"/>
           </p:nvPr>
-        </p:nvSpPr>
-        <p:spPr/>
-        <p:txBody>
-          <a:bodyPr/>
-          <a:lstStyle/>
-          <a:p>
-            <a:endParaRPr lang="fr-FR" dirty="0"/>
-          </a:p>
-        </p:txBody>
-      </p:sp>
+        </p:nvPicPr>
+        <p:blipFill>
+          <a:blip r:embed="rId2">
+            <a:extLst>
+              <a:ext uri="{28A0092B-C50C-407E-A947-70E740481C1C}">
+                <a14:useLocalDpi xmlns:a14="http://schemas.microsoft.com/office/drawing/2010/main" val="0"/>
+              </a:ext>
+            </a:extLst>
+          </a:blip>
+          <a:stretch>
+            <a:fillRect/>
+          </a:stretch>
+        </p:blipFill>
+        <p:spPr>
+          <a:xfrm>
+            <a:off x="2939371" y="2160588"/>
+            <a:ext cx="4073295" cy="3881437"/>
+          </a:xfrm>
+        </p:spPr>
+      </p:pic>
       <p:sp>
         <p:nvSpPr>
           <p:cNvPr id="3" name="ZoneTexte 2"/>
@@ -6738,6 +6749,158 @@
     <p:extLst>
       <p:ext uri="{BB962C8B-B14F-4D97-AF65-F5344CB8AC3E}">
         <p14:creationId xmlns:p14="http://schemas.microsoft.com/office/powerpoint/2010/main" val="701775868"/>
+      </p:ext>
+    </p:extLst>
+  </p:cSld>
+  <p:clrMapOvr>
+    <a:masterClrMapping/>
+  </p:clrMapOvr>
+  <p:timing>
+    <p:tnLst>
+      <p:par>
+        <p:cTn id="1" dur="indefinite" restart="never" nodeType="tmRoot"/>
+      </p:par>
+    </p:tnLst>
+  </p:timing>
+</p:sld>
+</file>
+
+<file path=ppt/slides/slide7.xml><?xml version="1.0" encoding="utf-8"?>
+<p:sld xmlns:a="http://schemas.openxmlformats.org/drawingml/2006/main" xmlns:r="http://schemas.openxmlformats.org/officeDocument/2006/relationships" xmlns:p="http://schemas.openxmlformats.org/presentationml/2006/main">
+  <p:cSld>
+    <p:spTree>
+      <p:nvGrpSpPr>
+        <p:cNvPr id="1" name=""/>
+        <p:cNvGrpSpPr/>
+        <p:nvPr/>
+      </p:nvGrpSpPr>
+      <p:grpSpPr>
+        <a:xfrm>
+          <a:off x="0" y="0"/>
+          <a:ext cx="0" cy="0"/>
+          <a:chOff x="0" y="0"/>
+          <a:chExt cx="0" cy="0"/>
+        </a:xfrm>
+      </p:grpSpPr>
+      <p:sp>
+        <p:nvSpPr>
+          <p:cNvPr id="2" name="Titre 1"/>
+          <p:cNvSpPr>
+            <a:spLocks noGrp="1"/>
+          </p:cNvSpPr>
+          <p:nvPr>
+            <p:ph type="title"/>
+          </p:nvPr>
+        </p:nvSpPr>
+        <p:spPr>
+          <a:xfrm>
+            <a:off x="685355" y="481263"/>
+            <a:ext cx="8596668" cy="1320800"/>
+          </a:xfrm>
+        </p:spPr>
+        <p:txBody>
+          <a:bodyPr>
+            <a:normAutofit fontScale="90000"/>
+          </a:bodyPr>
+          <a:lstStyle/>
+          <a:p>
+            <a:r>
+              <a:rPr lang="fr-FR" dirty="0" smtClean="0"/>
+              <a:t>Deuxième normalisation</a:t>
+            </a:r>
+            <a:br>
+              <a:rPr lang="fr-FR" dirty="0" smtClean="0"/>
+            </a:br>
+            <a:r>
+              <a:rPr lang="fr-FR" dirty="0" smtClean="0"/>
+              <a:t/>
+            </a:r>
+            <a:br>
+              <a:rPr lang="fr-FR" dirty="0" smtClean="0"/>
+            </a:br>
+            <a:endParaRPr lang="fr-FR" dirty="0"/>
+          </a:p>
+        </p:txBody>
+      </p:sp>
+      <p:pic>
+        <p:nvPicPr>
+          <p:cNvPr id="5" name="Espace réservé du contenu 4"/>
+          <p:cNvPicPr>
+            <a:picLocks noGrp="1" noChangeAspect="1"/>
+          </p:cNvPicPr>
+          <p:nvPr>
+            <p:ph idx="1"/>
+          </p:nvPr>
+        </p:nvPicPr>
+        <p:blipFill>
+          <a:blip r:embed="rId2">
+            <a:extLst>
+              <a:ext uri="{28A0092B-C50C-407E-A947-70E740481C1C}">
+                <a14:useLocalDpi xmlns:a14="http://schemas.microsoft.com/office/drawing/2010/main" val="0"/>
+              </a:ext>
+            </a:extLst>
+          </a:blip>
+          <a:stretch>
+            <a:fillRect/>
+          </a:stretch>
+        </p:blipFill>
+        <p:spPr>
+          <a:xfrm>
+            <a:off x="2939371" y="2160588"/>
+            <a:ext cx="4073295" cy="3881437"/>
+          </a:xfrm>
+        </p:spPr>
+      </p:pic>
+      <p:sp>
+        <p:nvSpPr>
+          <p:cNvPr id="3" name="ZoneTexte 2"/>
+          <p:cNvSpPr txBox="1"/>
+          <p:nvPr/>
+        </p:nvSpPr>
+        <p:spPr>
+          <a:xfrm>
+            <a:off x="1123513" y="1427328"/>
+            <a:ext cx="7720351" cy="369332"/>
+          </a:xfrm>
+          <a:prstGeom prst="rect">
+            <a:avLst/>
+          </a:prstGeom>
+          <a:noFill/>
+        </p:spPr>
+        <p:txBody>
+          <a:bodyPr wrap="square" rtlCol="0">
+            <a:spAutoFit/>
+          </a:bodyPr>
+          <a:lstStyle/>
+          <a:p>
+            <a:r>
+              <a:rPr lang="fr-FR" dirty="0">
+                <a:latin typeface="Agency FB" panose="020B0503020202020204" pitchFamily="34" charset="0"/>
+              </a:rPr>
+              <a:t> </a:t>
+            </a:r>
+            <a:r>
+              <a:rPr lang="fr-FR" dirty="0" err="1" smtClean="0">
+                <a:latin typeface="Agency FB" panose="020B0503020202020204" pitchFamily="34" charset="0"/>
+              </a:rPr>
+              <a:t>postsegnormalize</a:t>
+            </a:r>
+            <a:r>
+              <a:rPr lang="fr-FR" dirty="0" smtClean="0">
+                <a:latin typeface="Agency FB" panose="020B0503020202020204" pitchFamily="34" charset="0"/>
+              </a:rPr>
+              <a:t>(data)</a:t>
+            </a:r>
+            <a:endParaRPr lang="fr-FR" dirty="0">
+              <a:latin typeface="Agency FB" panose="020B0503020202020204" pitchFamily="34" charset="0"/>
+            </a:endParaRPr>
+          </a:p>
+        </p:txBody>
+      </p:sp>
+    </p:spTree>
+    <p:extLst>
+      <p:ext uri="{BB962C8B-B14F-4D97-AF65-F5344CB8AC3E}">
+        <p14:creationId xmlns:p14="http://schemas.microsoft.com/office/powerpoint/2010/main" val="2791989526"/>
       </p:ext>
     </p:extLst>
   </p:cSld>

</xml_diff>